<commit_message>
Update spacing issue on slide
</commit_message>
<xml_diff>
--- a/assets/supporting docs/Walkthrough.pptx
+++ b/assets/supporting docs/Walkthrough.pptx
@@ -109,6 +109,11 @@
       </a:defRPr>
     </a:lvl9pPr>
   </p:defaultTextStyle>
+  <p:extLst>
+    <p:ext uri="{EFAFB233-063F-42B5-8137-9DF3F51BA10A}">
+      <p15:sldGuideLst xmlns:p15="http://schemas.microsoft.com/office/powerpoint/2012/main"/>
+    </p:ext>
+  </p:extLst>
 </p:presentation>
 </file>
 
@@ -8955,52 +8960,6 @@
           </a:p>
         </p:txBody>
       </p:sp>
-      <p:sp>
-        <p:nvSpPr>
-          <p:cNvPr id="49" name="TextBox 48">
-            <a:extLst>
-              <a:ext uri="{FF2B5EF4-FFF2-40B4-BE49-F238E27FC236}">
-                <a16:creationId xmlns:a16="http://schemas.microsoft.com/office/drawing/2014/main" id="{7D7B08A8-D0DF-4D40-ADDC-B62DD4ADF413}"/>
-              </a:ext>
-            </a:extLst>
-          </p:cNvPr>
-          <p:cNvSpPr txBox="1"/>
-          <p:nvPr/>
-        </p:nvSpPr>
-        <p:spPr>
-          <a:xfrm>
-            <a:off x="8424309" y="924951"/>
-            <a:ext cx="2309067" cy="830997"/>
-          </a:xfrm>
-          <a:prstGeom prst="rect">
-            <a:avLst/>
-          </a:prstGeom>
-          <a:noFill/>
-          <a:ln>
-            <a:noFill/>
-          </a:ln>
-        </p:spPr>
-        <p:txBody>
-          <a:bodyPr wrap="square" rtlCol="0">
-            <a:spAutoFit/>
-          </a:bodyPr>
-          <a:lstStyle/>
-          <a:p>
-            <a:pPr algn="ctr"/>
-            <a:r>
-              <a:rPr lang="en-US" sz="2400" b="1" dirty="0"/>
-              <a:t>CONVERGENT</a:t>
-            </a:r>
-          </a:p>
-          <a:p>
-            <a:pPr algn="ctr"/>
-            <a:r>
-              <a:rPr lang="en-US" sz="2400" b="1" dirty="0"/>
-              <a:t>ZONE</a:t>
-            </a:r>
-          </a:p>
-        </p:txBody>
-      </p:sp>
       <p:grpSp>
         <p:nvGrpSpPr>
           <p:cNvPr id="78" name="Group 77">
@@ -9938,6 +9897,52 @@
           </a:p>
         </p:txBody>
       </p:sp>
+      <p:sp>
+        <p:nvSpPr>
+          <p:cNvPr id="50" name="TextBox 49">
+            <a:extLst>
+              <a:ext uri="{FF2B5EF4-FFF2-40B4-BE49-F238E27FC236}">
+                <a16:creationId xmlns:a16="http://schemas.microsoft.com/office/drawing/2014/main" id="{5637947E-31D1-E841-ABE5-B8F7BDCFDE97}"/>
+              </a:ext>
+            </a:extLst>
+          </p:cNvPr>
+          <p:cNvSpPr txBox="1"/>
+          <p:nvPr/>
+        </p:nvSpPr>
+        <p:spPr>
+          <a:xfrm>
+            <a:off x="8424309" y="924951"/>
+            <a:ext cx="2572554" cy="830997"/>
+          </a:xfrm>
+          <a:prstGeom prst="rect">
+            <a:avLst/>
+          </a:prstGeom>
+          <a:noFill/>
+          <a:ln>
+            <a:noFill/>
+          </a:ln>
+        </p:spPr>
+        <p:txBody>
+          <a:bodyPr wrap="square" rtlCol="0">
+            <a:spAutoFit/>
+          </a:bodyPr>
+          <a:lstStyle/>
+          <a:p>
+            <a:pPr algn="ctr"/>
+            <a:r>
+              <a:rPr lang="en-US" sz="2400" b="1" dirty="0"/>
+              <a:t>CONVERGENT</a:t>
+            </a:r>
+          </a:p>
+          <a:p>
+            <a:pPr algn="ctr"/>
+            <a:r>
+              <a:rPr lang="en-US" sz="2400" b="1" dirty="0"/>
+              <a:t>ZONE</a:t>
+            </a:r>
+          </a:p>
+        </p:txBody>
+      </p:sp>
     </p:spTree>
     <p:extLst>
       <p:ext uri="{BB962C8B-B14F-4D97-AF65-F5344CB8AC3E}">
@@ -11151,7 +11156,7 @@
         <p:spPr>
           <a:xfrm>
             <a:off x="8424309" y="924951"/>
-            <a:ext cx="2309067" cy="830997"/>
+            <a:ext cx="2572554" cy="830997"/>
           </a:xfrm>
           <a:prstGeom prst="rect">
             <a:avLst/>

</xml_diff>